<commit_message>
Adding powerpoint presentation and adjusting the project notes
</commit_message>
<xml_diff>
--- a/Bank term deposit.pptx
+++ b/Bank term deposit.pptx
@@ -47,6 +47,9 @@
     <p:sldId id="295" r:id="rId41"/>
     <p:sldId id="296" r:id="rId42"/>
     <p:sldId id="297" r:id="rId43"/>
+    <p:sldId id="298" r:id="rId44"/>
+    <p:sldId id="299" r:id="rId45"/>
+    <p:sldId id="301" r:id="rId46"/>
   </p:sldIdLst>
   <p:sldSz cx="12192000" cy="6858000"/>
   <p:notesSz cx="6858000" cy="9144000"/>
@@ -349,7 +352,7 @@
           <a:p>
             <a:fld id="{96DFF08F-DC6B-4601-B491-B0F83F6DD2DA}" type="datetimeFigureOut">
               <a:rPr lang="en-US" dirty="0"/>
-              <a:t>1/3/2024</a:t>
+              <a:t>1/5/2024</a:t>
             </a:fld>
             <a:endParaRPr lang="en-US" dirty="0"/>
           </a:p>
@@ -565,7 +568,7 @@
           <a:p>
             <a:fld id="{96DFF08F-DC6B-4601-B491-B0F83F6DD2DA}" type="datetimeFigureOut">
               <a:rPr lang="en-US" dirty="0"/>
-              <a:t>1/3/2024</a:t>
+              <a:t>1/5/2024</a:t>
             </a:fld>
             <a:endParaRPr lang="en-US" dirty="0"/>
           </a:p>
@@ -740,7 +743,7 @@
           <a:p>
             <a:fld id="{96DFF08F-DC6B-4601-B491-B0F83F6DD2DA}" type="datetimeFigureOut">
               <a:rPr lang="en-US" dirty="0"/>
-              <a:t>1/3/2024</a:t>
+              <a:t>1/5/2024</a:t>
             </a:fld>
             <a:endParaRPr lang="en-US" dirty="0"/>
           </a:p>
@@ -905,7 +908,7 @@
           <a:p>
             <a:fld id="{96DFF08F-DC6B-4601-B491-B0F83F6DD2DA}" type="datetimeFigureOut">
               <a:rPr lang="en-US" dirty="0"/>
-              <a:t>1/3/2024</a:t>
+              <a:t>1/5/2024</a:t>
             </a:fld>
             <a:endParaRPr lang="en-US" dirty="0"/>
           </a:p>
@@ -1151,7 +1154,7 @@
           <a:p>
             <a:fld id="{96DFF08F-DC6B-4601-B491-B0F83F6DD2DA}" type="datetimeFigureOut">
               <a:rPr lang="en-US" dirty="0"/>
-              <a:t>1/3/2024</a:t>
+              <a:t>1/5/2024</a:t>
             </a:fld>
             <a:endParaRPr lang="en-US" dirty="0"/>
           </a:p>
@@ -1469,7 +1472,7 @@
           <a:p>
             <a:fld id="{96DFF08F-DC6B-4601-B491-B0F83F6DD2DA}" type="datetimeFigureOut">
               <a:rPr lang="en-US" dirty="0"/>
-              <a:t>1/3/2024</a:t>
+              <a:t>1/5/2024</a:t>
             </a:fld>
             <a:endParaRPr lang="en-US" dirty="0"/>
           </a:p>
@@ -1888,7 +1891,7 @@
           <a:p>
             <a:fld id="{96DFF08F-DC6B-4601-B491-B0F83F6DD2DA}" type="datetimeFigureOut">
               <a:rPr lang="en-US" dirty="0"/>
-              <a:t>1/3/2024</a:t>
+              <a:t>1/5/2024</a:t>
             </a:fld>
             <a:endParaRPr lang="en-US" dirty="0"/>
           </a:p>
@@ -2001,7 +2004,7 @@
           <a:p>
             <a:fld id="{96DFF08F-DC6B-4601-B491-B0F83F6DD2DA}" type="datetimeFigureOut">
               <a:rPr lang="en-US" dirty="0"/>
-              <a:t>1/3/2024</a:t>
+              <a:t>1/5/2024</a:t>
             </a:fld>
             <a:endParaRPr lang="en-US" dirty="0"/>
           </a:p>
@@ -2091,7 +2094,7 @@
           <a:p>
             <a:fld id="{96DFF08F-DC6B-4601-B491-B0F83F6DD2DA}" type="datetimeFigureOut">
               <a:rPr lang="en-US" dirty="0"/>
-              <a:t>1/3/2024</a:t>
+              <a:t>1/5/2024</a:t>
             </a:fld>
             <a:endParaRPr lang="en-US" dirty="0"/>
           </a:p>
@@ -2376,7 +2379,7 @@
           <a:p>
             <a:fld id="{96DFF08F-DC6B-4601-B491-B0F83F6DD2DA}" type="datetimeFigureOut">
               <a:rPr lang="en-US" dirty="0"/>
-              <a:t>1/3/2024</a:t>
+              <a:t>1/5/2024</a:t>
             </a:fld>
             <a:endParaRPr lang="en-US" dirty="0"/>
           </a:p>
@@ -2643,7 +2646,7 @@
           <a:p>
             <a:fld id="{96DFF08F-DC6B-4601-B491-B0F83F6DD2DA}" type="datetimeFigureOut">
               <a:rPr lang="en-US" dirty="0"/>
-              <a:t>1/3/2024</a:t>
+              <a:t>1/5/2024</a:t>
             </a:fld>
             <a:endParaRPr lang="en-US" dirty="0"/>
           </a:p>
@@ -2893,7 +2896,7 @@
             <a:fld id="{96DFF08F-DC6B-4601-B491-B0F83F6DD2DA}" type="datetimeFigureOut">
               <a:rPr lang="en-US" dirty="0"/>
               <a:pPr/>
-              <a:t>1/3/2024</a:t>
+              <a:t>1/5/2024</a:t>
             </a:fld>
             <a:endParaRPr lang="en-US" dirty="0"/>
           </a:p>
@@ -8489,13 +8492,13 @@
   <p:clrMapOvr>
     <a:masterClrMapping/>
   </p:clrMapOvr>
-  <mc:AlternateContent xmlns:mc="http://schemas.openxmlformats.org/markup-compatibility/2006">
-    <mc:Choice xmlns:p14="http://schemas.microsoft.com/office/powerpoint/2010/main" Requires="p14">
+  <mc:AlternateContent xmlns:mc="http://schemas.openxmlformats.org/markup-compatibility/2006" xmlns:p14="http://schemas.microsoft.com/office/powerpoint/2010/main">
+    <mc:Choice Requires="p14">
       <p:transition p14:dur="100">
         <p:cut/>
       </p:transition>
     </mc:Choice>
-    <mc:Fallback>
+    <mc:Fallback xmlns="">
       <p:transition>
         <p:cut/>
       </p:transition>
@@ -9633,6 +9636,514 @@
   <p:transition spd="med">
     <p:pull/>
   </p:transition>
+</p:sld>
+</file>
+
+<file path=ppt/slides/slide43.xml><?xml version="1.0" encoding="utf-8"?>
+<p:sld xmlns:a="http://schemas.openxmlformats.org/drawingml/2006/main" xmlns:r="http://schemas.openxmlformats.org/officeDocument/2006/relationships" xmlns:p="http://schemas.openxmlformats.org/presentationml/2006/main">
+  <p:cSld>
+    <p:spTree>
+      <p:nvGrpSpPr>
+        <p:cNvPr id="1" name=""/>
+        <p:cNvGrpSpPr/>
+        <p:nvPr/>
+      </p:nvGrpSpPr>
+      <p:grpSpPr>
+        <a:xfrm>
+          <a:off x="0" y="0"/>
+          <a:ext cx="0" cy="0"/>
+          <a:chOff x="0" y="0"/>
+          <a:chExt cx="0" cy="0"/>
+        </a:xfrm>
+      </p:grpSpPr>
+      <p:sp>
+        <p:nvSpPr>
+          <p:cNvPr id="2" name="Title 1">
+            <a:extLst>
+              <a:ext uri="{FF2B5EF4-FFF2-40B4-BE49-F238E27FC236}">
+                <a16:creationId xmlns:a16="http://schemas.microsoft.com/office/drawing/2014/main" id="{752D8CCD-5255-DB4B-FCC7-1CFE0E50E417}"/>
+              </a:ext>
+            </a:extLst>
+          </p:cNvPr>
+          <p:cNvSpPr>
+            <a:spLocks noGrp="1"/>
+          </p:cNvSpPr>
+          <p:nvPr>
+            <p:ph type="title"/>
+          </p:nvPr>
+        </p:nvSpPr>
+        <p:spPr>
+          <a:xfrm>
+            <a:off x="1143000" y="483080"/>
+            <a:ext cx="9875520" cy="1035170"/>
+          </a:xfrm>
+        </p:spPr>
+        <p:txBody>
+          <a:bodyPr>
+            <a:normAutofit/>
+          </a:bodyPr>
+          <a:lstStyle/>
+          <a:p>
+            <a:r>
+              <a:rPr lang="en-US" b="1" dirty="0">
+                <a:effectLst/>
+                <a:ea typeface="Times New Roman" panose="02020603050405020304" pitchFamily="18" charset="0"/>
+              </a:rPr>
+              <a:t>Conclusion:</a:t>
+            </a:r>
+            <a:endParaRPr lang="en-US" b="1" dirty="0"/>
+          </a:p>
+        </p:txBody>
+      </p:sp>
+      <p:sp>
+        <p:nvSpPr>
+          <p:cNvPr id="3" name="Content Placeholder 2">
+            <a:extLst>
+              <a:ext uri="{FF2B5EF4-FFF2-40B4-BE49-F238E27FC236}">
+                <a16:creationId xmlns:a16="http://schemas.microsoft.com/office/drawing/2014/main" id="{7DF2D9A6-301F-6A23-BB12-C8F0F7F5C0E4}"/>
+              </a:ext>
+            </a:extLst>
+          </p:cNvPr>
+          <p:cNvSpPr>
+            <a:spLocks noGrp="1"/>
+          </p:cNvSpPr>
+          <p:nvPr>
+            <p:ph idx="1"/>
+          </p:nvPr>
+        </p:nvSpPr>
+        <p:spPr>
+          <a:xfrm>
+            <a:off x="690113" y="1362975"/>
+            <a:ext cx="10869283" cy="4733026"/>
+          </a:xfrm>
+        </p:spPr>
+        <p:txBody>
+          <a:bodyPr>
+            <a:normAutofit lnSpcReduction="10000"/>
+          </a:bodyPr>
+          <a:lstStyle/>
+          <a:p>
+            <a:pPr marL="0" marR="0">
+              <a:spcBef>
+                <a:spcPts val="1500"/>
+              </a:spcBef>
+              <a:spcAft>
+                <a:spcPts val="1500"/>
+              </a:spcAft>
+            </a:pPr>
+            <a:r>
+              <a:rPr lang="en-US" sz="2400" dirty="0">
+                <a:effectLst/>
+                <a:ea typeface="Times New Roman" panose="02020603050405020304" pitchFamily="18" charset="0"/>
+              </a:rPr>
+              <a:t>In conclusion, Direct Marketing Campaigns for Bank Term Deposits play a crucial role in attracting and retaining customers, fostering long-term relationships, and boosting overall profitability for financial institutions. The ability to target specific audiences with personalized messages allows banks to communicate the value of term deposits effectively. Through the analysis of customer data and segmentation, direct marketing campaigns can be tailored to address the unique needs and preferences of different customer segments, thereby maximizing the chances of success.</a:t>
+            </a:r>
+          </a:p>
+          <a:p>
+            <a:pPr marL="0" marR="0" algn="l">
+              <a:spcBef>
+                <a:spcPts val="1500"/>
+              </a:spcBef>
+              <a:spcAft>
+                <a:spcPts val="1500"/>
+              </a:spcAft>
+            </a:pPr>
+            <a:r>
+              <a:rPr lang="en-US" sz="2400" dirty="0">
+                <a:effectLst/>
+                <a:ea typeface="Times New Roman" panose="02020603050405020304" pitchFamily="18" charset="0"/>
+              </a:rPr>
+              <a:t>Furthermore, the integration of digital channels, such as email marketing, social media, and targeted online advertising, has significantly enhanced the reach and efficiency of direct marketing efforts. These channels enable banks to engage with customers in real-time, delivering timely and relevant information about term deposit offerings.</a:t>
+            </a:r>
+          </a:p>
+          <a:p>
+            <a:endParaRPr lang="en-US" dirty="0"/>
+          </a:p>
+        </p:txBody>
+      </p:sp>
+    </p:spTree>
+    <p:extLst>
+      <p:ext uri="{BB962C8B-B14F-4D97-AF65-F5344CB8AC3E}">
+        <p14:creationId xmlns:p14="http://schemas.microsoft.com/office/powerpoint/2010/main" val="1915452371"/>
+      </p:ext>
+    </p:extLst>
+  </p:cSld>
+  <p:clrMapOvr>
+    <a:masterClrMapping/>
+  </p:clrMapOvr>
+  <mc:AlternateContent xmlns:mc="http://schemas.openxmlformats.org/markup-compatibility/2006">
+    <mc:Choice xmlns:p15="http://schemas.microsoft.com/office/powerpoint/2012/main" Requires="p15">
+      <p:transition xmlns:p14="http://schemas.microsoft.com/office/powerpoint/2010/main" spd="slow" p14:dur="1250">
+        <p15:prstTrans prst="peelOff"/>
+      </p:transition>
+    </mc:Choice>
+    <mc:Fallback>
+      <p:transition spd="slow">
+        <p:fade/>
+      </p:transition>
+    </mc:Fallback>
+  </mc:AlternateContent>
+</p:sld>
+</file>
+
+<file path=ppt/slides/slide44.xml><?xml version="1.0" encoding="utf-8"?>
+<p:sld xmlns:a="http://schemas.openxmlformats.org/drawingml/2006/main" xmlns:r="http://schemas.openxmlformats.org/officeDocument/2006/relationships" xmlns:p="http://schemas.openxmlformats.org/presentationml/2006/main">
+  <p:cSld>
+    <p:spTree>
+      <p:nvGrpSpPr>
+        <p:cNvPr id="1" name=""/>
+        <p:cNvGrpSpPr/>
+        <p:nvPr/>
+      </p:nvGrpSpPr>
+      <p:grpSpPr>
+        <a:xfrm>
+          <a:off x="0" y="0"/>
+          <a:ext cx="0" cy="0"/>
+          <a:chOff x="0" y="0"/>
+          <a:chExt cx="0" cy="0"/>
+        </a:xfrm>
+      </p:grpSpPr>
+      <p:sp>
+        <p:nvSpPr>
+          <p:cNvPr id="2" name="Title 1">
+            <a:extLst>
+              <a:ext uri="{FF2B5EF4-FFF2-40B4-BE49-F238E27FC236}">
+                <a16:creationId xmlns:a16="http://schemas.microsoft.com/office/drawing/2014/main" id="{FA8AF017-5247-BF09-548A-389CA3363AF4}"/>
+              </a:ext>
+            </a:extLst>
+          </p:cNvPr>
+          <p:cNvSpPr>
+            <a:spLocks noGrp="1"/>
+          </p:cNvSpPr>
+          <p:nvPr>
+            <p:ph type="title"/>
+          </p:nvPr>
+        </p:nvSpPr>
+        <p:spPr>
+          <a:xfrm>
+            <a:off x="1143000" y="609600"/>
+            <a:ext cx="9875520" cy="822385"/>
+          </a:xfrm>
+        </p:spPr>
+        <p:txBody>
+          <a:bodyPr/>
+          <a:lstStyle/>
+          <a:p>
+            <a:r>
+              <a:rPr lang="en-US" dirty="0"/>
+              <a:t>Recommendation: </a:t>
+            </a:r>
+          </a:p>
+        </p:txBody>
+      </p:sp>
+      <p:sp>
+        <p:nvSpPr>
+          <p:cNvPr id="3" name="Content Placeholder 2">
+            <a:extLst>
+              <a:ext uri="{FF2B5EF4-FFF2-40B4-BE49-F238E27FC236}">
+                <a16:creationId xmlns:a16="http://schemas.microsoft.com/office/drawing/2014/main" id="{B2FDBDA1-3A3B-7608-4FCE-4492687411D8}"/>
+              </a:ext>
+            </a:extLst>
+          </p:cNvPr>
+          <p:cNvSpPr>
+            <a:spLocks noGrp="1"/>
+          </p:cNvSpPr>
+          <p:nvPr>
+            <p:ph idx="1"/>
+          </p:nvPr>
+        </p:nvSpPr>
+        <p:spPr>
+          <a:xfrm>
+            <a:off x="638356" y="1293962"/>
+            <a:ext cx="10377516" cy="5089585"/>
+          </a:xfrm>
+        </p:spPr>
+        <p:txBody>
+          <a:bodyPr>
+            <a:normAutofit fontScale="92500" lnSpcReduction="20000"/>
+          </a:bodyPr>
+          <a:lstStyle/>
+          <a:p>
+            <a:r>
+              <a:rPr lang="en-US" dirty="0">
+                <a:effectLst/>
+                <a:ea typeface="Times New Roman" panose="02020603050405020304" pitchFamily="18" charset="0"/>
+              </a:rPr>
+              <a:t>To enhance the effectiveness of Direct Marketing Campaigns for Bank Term Deposits, the following recommendations are proposed:</a:t>
+            </a:r>
+          </a:p>
+          <a:p>
+            <a:pPr marL="731520" lvl="1" indent="-457200">
+              <a:buFont typeface="+mj-lt"/>
+              <a:buAutoNum type="alphaLcParenR"/>
+            </a:pPr>
+            <a:r>
+              <a:rPr lang="en-US" b="1" dirty="0">
+                <a:effectLst/>
+                <a:latin typeface="Segoe UI" panose="020B0502040204020203" pitchFamily="34" charset="0"/>
+                <a:ea typeface="Times New Roman" panose="02020603050405020304" pitchFamily="18" charset="0"/>
+              </a:rPr>
+              <a:t>Multichannel Approach:</a:t>
+            </a:r>
+            <a:r>
+              <a:rPr lang="en-US" dirty="0">
+                <a:effectLst/>
+                <a:latin typeface="Segoe UI" panose="020B0502040204020203" pitchFamily="34" charset="0"/>
+                <a:ea typeface="Times New Roman" panose="02020603050405020304" pitchFamily="18" charset="0"/>
+              </a:rPr>
+              <a:t> Implement a multichannel approach that integrates traditional and digital marketing channels. This includes utilizing email marketing, social media, online advertising, and direct mail to reach a broader audience and reinforce the marketing message through various touchpoints.</a:t>
+            </a:r>
+            <a:endParaRPr lang="en-US" dirty="0">
+              <a:effectLst/>
+              <a:latin typeface="Times New Roman" panose="02020603050405020304" pitchFamily="18" charset="0"/>
+              <a:ea typeface="Times New Roman" panose="02020603050405020304" pitchFamily="18" charset="0"/>
+            </a:endParaRPr>
+          </a:p>
+          <a:p>
+            <a:pPr marL="571500" lvl="1" indent="-342900">
+              <a:spcBef>
+                <a:spcPts val="0"/>
+              </a:spcBef>
+              <a:spcAft>
+                <a:spcPts val="0"/>
+              </a:spcAft>
+              <a:buFont typeface="+mj-lt"/>
+              <a:buAutoNum type="alphaLcParenR"/>
+              <a:tabLst>
+                <a:tab pos="457200" algn="l"/>
+              </a:tabLst>
+            </a:pPr>
+            <a:r>
+              <a:rPr lang="en-US" b="1" dirty="0">
+                <a:effectLst/>
+                <a:latin typeface="Segoe UI" panose="020B0502040204020203" pitchFamily="34" charset="0"/>
+                <a:ea typeface="Times New Roman" panose="02020603050405020304" pitchFamily="18" charset="0"/>
+              </a:rPr>
+              <a:t>Personalization:</a:t>
+            </a:r>
+            <a:r>
+              <a:rPr lang="en-US" dirty="0">
+                <a:effectLst/>
+                <a:latin typeface="Segoe UI" panose="020B0502040204020203" pitchFamily="34" charset="0"/>
+                <a:ea typeface="Times New Roman" panose="02020603050405020304" pitchFamily="18" charset="0"/>
+              </a:rPr>
+              <a:t> Continue to prioritize personalization in marketing messages. Customers respond positively to content that is tailored to their individual needs and interests. Utilize customer data to craft personalized offers and incentives that encourage them to consider and invest in bank term deposits.</a:t>
+            </a:r>
+            <a:endParaRPr lang="en-US" dirty="0">
+              <a:effectLst/>
+              <a:latin typeface="Times New Roman" panose="02020603050405020304" pitchFamily="18" charset="0"/>
+              <a:ea typeface="Times New Roman" panose="02020603050405020304" pitchFamily="18" charset="0"/>
+            </a:endParaRPr>
+          </a:p>
+          <a:p>
+            <a:pPr marL="571500" lvl="1" indent="-342900">
+              <a:spcBef>
+                <a:spcPts val="0"/>
+              </a:spcBef>
+              <a:spcAft>
+                <a:spcPts val="0"/>
+              </a:spcAft>
+              <a:buFont typeface="+mj-lt"/>
+              <a:buAutoNum type="alphaLcParenR"/>
+              <a:tabLst>
+                <a:tab pos="457200" algn="l"/>
+              </a:tabLst>
+            </a:pPr>
+            <a:r>
+              <a:rPr lang="en-US" b="1" dirty="0">
+                <a:effectLst/>
+                <a:latin typeface="Segoe UI" panose="020B0502040204020203" pitchFamily="34" charset="0"/>
+                <a:ea typeface="Times New Roman" panose="02020603050405020304" pitchFamily="18" charset="0"/>
+              </a:rPr>
+              <a:t>Timely and Relevant Communication:</a:t>
+            </a:r>
+            <a:r>
+              <a:rPr lang="en-US" dirty="0">
+                <a:effectLst/>
+                <a:latin typeface="Segoe UI" panose="020B0502040204020203" pitchFamily="34" charset="0"/>
+                <a:ea typeface="Times New Roman" panose="02020603050405020304" pitchFamily="18" charset="0"/>
+              </a:rPr>
+              <a:t> Ensure that communication is timely and relevant. Keep customers informed about changes in interest rates, special promotions, and other relevant information. Automated systems can help in sending timely reminders and updates to maintain customer engagement.</a:t>
+            </a:r>
+            <a:endParaRPr lang="en-US" dirty="0">
+              <a:effectLst/>
+              <a:latin typeface="Times New Roman" panose="02020603050405020304" pitchFamily="18" charset="0"/>
+              <a:ea typeface="Times New Roman" panose="02020603050405020304" pitchFamily="18" charset="0"/>
+            </a:endParaRPr>
+          </a:p>
+          <a:p>
+            <a:pPr marL="571500" lvl="1" indent="-342900">
+              <a:spcBef>
+                <a:spcPts val="0"/>
+              </a:spcBef>
+              <a:spcAft>
+                <a:spcPts val="0"/>
+              </a:spcAft>
+              <a:buFont typeface="+mj-lt"/>
+              <a:buAutoNum type="alphaLcParenR"/>
+              <a:tabLst>
+                <a:tab pos="457200" algn="l"/>
+              </a:tabLst>
+            </a:pPr>
+            <a:r>
+              <a:rPr lang="en-US" b="1" dirty="0">
+                <a:effectLst/>
+                <a:latin typeface="Segoe UI" panose="020B0502040204020203" pitchFamily="34" charset="0"/>
+                <a:ea typeface="Times New Roman" panose="02020603050405020304" pitchFamily="18" charset="0"/>
+              </a:rPr>
+              <a:t>Compliance and Transparency:</a:t>
+            </a:r>
+            <a:r>
+              <a:rPr lang="en-US" dirty="0">
+                <a:effectLst/>
+                <a:latin typeface="Segoe UI" panose="020B0502040204020203" pitchFamily="34" charset="0"/>
+                <a:ea typeface="Times New Roman" panose="02020603050405020304" pitchFamily="18" charset="0"/>
+              </a:rPr>
+              <a:t> Maintain a strong focus on compliance with regulatory requirements and ensure transparency in all communications. Customers appreciate clear and honest information about terms, conditions, and potential risks associated with term deposits.</a:t>
+            </a:r>
+            <a:endParaRPr lang="en-US" dirty="0">
+              <a:effectLst/>
+              <a:latin typeface="Times New Roman" panose="02020603050405020304" pitchFamily="18" charset="0"/>
+              <a:ea typeface="Times New Roman" panose="02020603050405020304" pitchFamily="18" charset="0"/>
+            </a:endParaRPr>
+          </a:p>
+          <a:p>
+            <a:pPr marL="571500" lvl="1" indent="-342900">
+              <a:spcBef>
+                <a:spcPts val="0"/>
+              </a:spcBef>
+              <a:spcAft>
+                <a:spcPts val="0"/>
+              </a:spcAft>
+              <a:buFont typeface="+mj-lt"/>
+              <a:buAutoNum type="alphaLcParenR"/>
+              <a:tabLst>
+                <a:tab pos="457200" algn="l"/>
+              </a:tabLst>
+            </a:pPr>
+            <a:r>
+              <a:rPr lang="en-US" b="1" dirty="0">
+                <a:effectLst/>
+                <a:latin typeface="Segoe UI" panose="020B0502040204020203" pitchFamily="34" charset="0"/>
+                <a:ea typeface="Times New Roman" panose="02020603050405020304" pitchFamily="18" charset="0"/>
+              </a:rPr>
+              <a:t>Feedback and Continuous Improvement:</a:t>
+            </a:r>
+            <a:r>
+              <a:rPr lang="en-US" dirty="0">
+                <a:effectLst/>
+                <a:latin typeface="Segoe UI" panose="020B0502040204020203" pitchFamily="34" charset="0"/>
+                <a:ea typeface="Times New Roman" panose="02020603050405020304" pitchFamily="18" charset="0"/>
+              </a:rPr>
+              <a:t> Establish mechanisms for collecting customer feedback on marketing campaigns. Analyze the performance metrics and customer responses to identify areas for improvement. Implement a continuous improvement process to refine future campaigns based on insights gained.</a:t>
+            </a:r>
+            <a:endParaRPr lang="en-US" dirty="0">
+              <a:effectLst/>
+              <a:latin typeface="Times New Roman" panose="02020603050405020304" pitchFamily="18" charset="0"/>
+              <a:ea typeface="Times New Roman" panose="02020603050405020304" pitchFamily="18" charset="0"/>
+            </a:endParaRPr>
+          </a:p>
+          <a:p>
+            <a:pPr marL="731520" lvl="1" indent="-457200">
+              <a:buFont typeface="+mj-lt"/>
+              <a:buAutoNum type="alphaLcParenR"/>
+            </a:pPr>
+            <a:endParaRPr lang="en-US" dirty="0"/>
+          </a:p>
+        </p:txBody>
+      </p:sp>
+    </p:spTree>
+    <p:extLst>
+      <p:ext uri="{BB962C8B-B14F-4D97-AF65-F5344CB8AC3E}">
+        <p14:creationId xmlns:p14="http://schemas.microsoft.com/office/powerpoint/2010/main" val="1085504806"/>
+      </p:ext>
+    </p:extLst>
+  </p:cSld>
+  <p:clrMapOvr>
+    <a:masterClrMapping/>
+  </p:clrMapOvr>
+  <mc:AlternateContent xmlns:mc="http://schemas.openxmlformats.org/markup-compatibility/2006">
+    <mc:Choice xmlns:p15="http://schemas.microsoft.com/office/powerpoint/2012/main" Requires="p15">
+      <p:transition xmlns:p14="http://schemas.microsoft.com/office/powerpoint/2010/main" spd="slow" p14:dur="1250">
+        <p15:prstTrans prst="peelOff"/>
+      </p:transition>
+    </mc:Choice>
+    <mc:Fallback>
+      <p:transition spd="slow">
+        <p:fade/>
+      </p:transition>
+    </mc:Fallback>
+  </mc:AlternateContent>
+</p:sld>
+</file>
+
+<file path=ppt/slides/slide45.xml><?xml version="1.0" encoding="utf-8"?>
+<p:sld xmlns:a="http://schemas.openxmlformats.org/drawingml/2006/main" xmlns:r="http://schemas.openxmlformats.org/officeDocument/2006/relationships" xmlns:p="http://schemas.openxmlformats.org/presentationml/2006/main">
+  <p:cSld>
+    <p:spTree>
+      <p:nvGrpSpPr>
+        <p:cNvPr id="1" name=""/>
+        <p:cNvGrpSpPr/>
+        <p:nvPr/>
+      </p:nvGrpSpPr>
+      <p:grpSpPr>
+        <a:xfrm>
+          <a:off x="0" y="0"/>
+          <a:ext cx="0" cy="0"/>
+          <a:chOff x="0" y="0"/>
+          <a:chExt cx="0" cy="0"/>
+        </a:xfrm>
+      </p:grpSpPr>
+      <p:sp>
+        <p:nvSpPr>
+          <p:cNvPr id="2" name="Title 1">
+            <a:extLst>
+              <a:ext uri="{FF2B5EF4-FFF2-40B4-BE49-F238E27FC236}">
+                <a16:creationId xmlns:a16="http://schemas.microsoft.com/office/drawing/2014/main" id="{7B2AE1B0-A243-7D37-18D1-15766534EBE2}"/>
+              </a:ext>
+            </a:extLst>
+          </p:cNvPr>
+          <p:cNvSpPr>
+            <a:spLocks noGrp="1"/>
+          </p:cNvSpPr>
+          <p:nvPr>
+            <p:ph type="ctrTitle"/>
+          </p:nvPr>
+        </p:nvSpPr>
+        <p:spPr/>
+        <p:txBody>
+          <a:bodyPr/>
+          <a:lstStyle/>
+          <a:p>
+            <a:r>
+              <a:rPr lang="en-US" dirty="0"/>
+              <a:t>END</a:t>
+            </a:r>
+          </a:p>
+        </p:txBody>
+      </p:sp>
+    </p:spTree>
+    <p:extLst>
+      <p:ext uri="{BB962C8B-B14F-4D97-AF65-F5344CB8AC3E}">
+        <p14:creationId xmlns:p14="http://schemas.microsoft.com/office/powerpoint/2010/main" val="2637120777"/>
+      </p:ext>
+    </p:extLst>
+  </p:cSld>
+  <p:clrMapOvr>
+    <a:masterClrMapping/>
+  </p:clrMapOvr>
+  <mc:AlternateContent xmlns:mc="http://schemas.openxmlformats.org/markup-compatibility/2006">
+    <mc:Choice xmlns:p14="http://schemas.microsoft.com/office/powerpoint/2010/main" Requires="p14">
+      <p:transition spd="slow" p14:dur="1200">
+        <p:dissolve/>
+      </p:transition>
+    </mc:Choice>
+    <mc:Fallback>
+      <p:transition spd="slow">
+        <p:dissolve/>
+      </p:transition>
+    </mc:Fallback>
+  </mc:AlternateContent>
 </p:sld>
 </file>
 

</xml_diff>